<commit_message>
Added a new build with working Volley.
</commit_message>
<xml_diff>
--- a/Working files/Pages.pptx
+++ b/Working files/Pages.pptx
@@ -9,8 +9,9 @@
     <p:sldId id="257" r:id="rId3"/>
     <p:sldId id="258" r:id="rId4"/>
     <p:sldId id="259" r:id="rId5"/>
-    <p:sldId id="261" r:id="rId6"/>
-    <p:sldId id="260" r:id="rId7"/>
+    <p:sldId id="263" r:id="rId6"/>
+    <p:sldId id="261" r:id="rId7"/>
+    <p:sldId id="260" r:id="rId8"/>
   </p:sldIdLst>
   <p:sldSz cx="12192000" cy="6858000"/>
   <p:notesSz cx="6858000" cy="9144000"/>
@@ -248,7 +249,7 @@
           <a:p>
             <a:fld id="{0DF82D07-03FB-49A1-A369-FAF4996E5316}" type="datetimeFigureOut">
               <a:rPr lang="bg-BG" smtClean="0"/>
-              <a:t>9.1.2016 г.</a:t>
+              <a:t>15.1.2016 г.</a:t>
             </a:fld>
             <a:endParaRPr lang="bg-BG"/>
           </a:p>
@@ -418,7 +419,7 @@
           <a:p>
             <a:fld id="{0DF82D07-03FB-49A1-A369-FAF4996E5316}" type="datetimeFigureOut">
               <a:rPr lang="bg-BG" smtClean="0"/>
-              <a:t>9.1.2016 г.</a:t>
+              <a:t>15.1.2016 г.</a:t>
             </a:fld>
             <a:endParaRPr lang="bg-BG"/>
           </a:p>
@@ -598,7 +599,7 @@
           <a:p>
             <a:fld id="{0DF82D07-03FB-49A1-A369-FAF4996E5316}" type="datetimeFigureOut">
               <a:rPr lang="bg-BG" smtClean="0"/>
-              <a:t>9.1.2016 г.</a:t>
+              <a:t>15.1.2016 г.</a:t>
             </a:fld>
             <a:endParaRPr lang="bg-BG"/>
           </a:p>
@@ -768,7 +769,7 @@
           <a:p>
             <a:fld id="{0DF82D07-03FB-49A1-A369-FAF4996E5316}" type="datetimeFigureOut">
               <a:rPr lang="bg-BG" smtClean="0"/>
-              <a:t>9.1.2016 г.</a:t>
+              <a:t>15.1.2016 г.</a:t>
             </a:fld>
             <a:endParaRPr lang="bg-BG"/>
           </a:p>
@@ -1038,7 +1039,7 @@
           <a:p>
             <a:fld id="{0DF82D07-03FB-49A1-A369-FAF4996E5316}" type="datetimeFigureOut">
               <a:rPr lang="bg-BG" smtClean="0"/>
-              <a:t>9.1.2016 г.</a:t>
+              <a:t>15.1.2016 г.</a:t>
             </a:fld>
             <a:endParaRPr lang="bg-BG"/>
           </a:p>
@@ -1270,7 +1271,7 @@
           <a:p>
             <a:fld id="{0DF82D07-03FB-49A1-A369-FAF4996E5316}" type="datetimeFigureOut">
               <a:rPr lang="bg-BG" smtClean="0"/>
-              <a:t>9.1.2016 г.</a:t>
+              <a:t>15.1.2016 г.</a:t>
             </a:fld>
             <a:endParaRPr lang="bg-BG"/>
           </a:p>
@@ -1637,7 +1638,7 @@
           <a:p>
             <a:fld id="{0DF82D07-03FB-49A1-A369-FAF4996E5316}" type="datetimeFigureOut">
               <a:rPr lang="bg-BG" smtClean="0"/>
-              <a:t>9.1.2016 г.</a:t>
+              <a:t>15.1.2016 г.</a:t>
             </a:fld>
             <a:endParaRPr lang="bg-BG"/>
           </a:p>
@@ -1755,7 +1756,7 @@
           <a:p>
             <a:fld id="{0DF82D07-03FB-49A1-A369-FAF4996E5316}" type="datetimeFigureOut">
               <a:rPr lang="bg-BG" smtClean="0"/>
-              <a:t>9.1.2016 г.</a:t>
+              <a:t>15.1.2016 г.</a:t>
             </a:fld>
             <a:endParaRPr lang="bg-BG"/>
           </a:p>
@@ -1850,7 +1851,7 @@
           <a:p>
             <a:fld id="{0DF82D07-03FB-49A1-A369-FAF4996E5316}" type="datetimeFigureOut">
               <a:rPr lang="bg-BG" smtClean="0"/>
-              <a:t>9.1.2016 г.</a:t>
+              <a:t>15.1.2016 г.</a:t>
             </a:fld>
             <a:endParaRPr lang="bg-BG"/>
           </a:p>
@@ -2127,7 +2128,7 @@
           <a:p>
             <a:fld id="{0DF82D07-03FB-49A1-A369-FAF4996E5316}" type="datetimeFigureOut">
               <a:rPr lang="bg-BG" smtClean="0"/>
-              <a:t>9.1.2016 г.</a:t>
+              <a:t>15.1.2016 г.</a:t>
             </a:fld>
             <a:endParaRPr lang="bg-BG"/>
           </a:p>
@@ -2380,7 +2381,7 @@
           <a:p>
             <a:fld id="{0DF82D07-03FB-49A1-A369-FAF4996E5316}" type="datetimeFigureOut">
               <a:rPr lang="bg-BG" smtClean="0"/>
-              <a:t>9.1.2016 г.</a:t>
+              <a:t>15.1.2016 г.</a:t>
             </a:fld>
             <a:endParaRPr lang="bg-BG"/>
           </a:p>
@@ -2593,7 +2594,7 @@
           <a:p>
             <a:fld id="{0DF82D07-03FB-49A1-A369-FAF4996E5316}" type="datetimeFigureOut">
               <a:rPr lang="bg-BG" smtClean="0"/>
-              <a:t>9.1.2016 г.</a:t>
+              <a:t>15.1.2016 г.</a:t>
             </a:fld>
             <a:endParaRPr lang="bg-BG"/>
           </a:p>
@@ -3033,7 +3034,7 @@
         <p:spPr>
           <a:xfrm>
             <a:off x="4756935" y="611312"/>
-            <a:ext cx="5393932" cy="1477328"/>
+            <a:ext cx="5393932" cy="2585323"/>
           </a:xfrm>
           <a:prstGeom prst="rect">
             <a:avLst/>
@@ -3091,8 +3092,23 @@
               <a:t>: </a:t>
             </a:r>
             <a:r>
+              <a:rPr lang="en-GB" dirty="0" smtClean="0"/>
+              <a:t>9bcc7d5492fb90c523ac4607906011eb</a:t>
+            </a:r>
+          </a:p>
+          <a:p>
+            <a:endParaRPr lang="en-GB" dirty="0"/>
+          </a:p>
+          <a:p>
+            <a:r>
+              <a:rPr lang="en-GB" b="1" dirty="0" smtClean="0"/>
+              <a:t>Change Language:</a:t>
+            </a:r>
+          </a:p>
+          <a:p>
+            <a:r>
               <a:rPr lang="en-GB" dirty="0"/>
-              <a:t>9bcc7d5492fb90c523ac4607906011eb</a:t>
+              <a:t>http://stackoverflow.com/questions/12908289/how-to-change-language-of-app-when-user-selects-language</a:t>
             </a:r>
             <a:endParaRPr lang="bg-BG" dirty="0"/>
           </a:p>
@@ -3641,7 +3657,7 @@
         <p:spPr>
           <a:xfrm>
             <a:off x="5825447" y="1122183"/>
-            <a:ext cx="4233147" cy="646331"/>
+            <a:ext cx="6231277" cy="1477328"/>
           </a:xfrm>
           <a:prstGeom prst="rect">
             <a:avLst/>
@@ -3649,7 +3665,7 @@
           <a:noFill/>
         </p:spPr>
         <p:txBody>
-          <a:bodyPr wrap="none" rtlCol="0">
+          <a:bodyPr wrap="square" rtlCol="0">
             <a:spAutoFit/>
           </a:bodyPr>
           <a:lstStyle/>
@@ -3666,7 +3682,50 @@
             </a:r>
             <a:r>
               <a:rPr lang="en-US" dirty="0" smtClean="0"/>
-              <a:t>- filter by rank and date</a:t>
+              <a:t>- filter by rank and </a:t>
+            </a:r>
+            <a:r>
+              <a:rPr lang="en-US" dirty="0" smtClean="0"/>
+              <a:t>date</a:t>
+            </a:r>
+          </a:p>
+          <a:p>
+            <a:endParaRPr lang="en-US" dirty="0"/>
+          </a:p>
+          <a:p>
+            <a:r>
+              <a:rPr lang="en-GB" dirty="0"/>
+              <a:t>http://api.themoviedb.org/3/movie/popular?api_key=9bcc7d5492fb90c523ac4607906011eb</a:t>
+            </a:r>
+            <a:endParaRPr lang="bg-BG" dirty="0"/>
+          </a:p>
+        </p:txBody>
+      </p:sp>
+      <p:sp>
+        <p:nvSpPr>
+          <p:cNvPr id="2" name="TextBox 1"/>
+          <p:cNvSpPr txBox="1"/>
+          <p:nvPr/>
+        </p:nvSpPr>
+        <p:spPr>
+          <a:xfrm>
+            <a:off x="5917914" y="3174715"/>
+            <a:ext cx="3744930" cy="369332"/>
+          </a:xfrm>
+          <a:prstGeom prst="rect">
+            <a:avLst/>
+          </a:prstGeom>
+          <a:noFill/>
+        </p:spPr>
+        <p:txBody>
+          <a:bodyPr wrap="square" rtlCol="0">
+            <a:spAutoFit/>
+          </a:bodyPr>
+          <a:lstStyle/>
+          <a:p>
+            <a:r>
+              <a:rPr lang="en-US" dirty="0" smtClean="0"/>
+              <a:t>Add  Search button</a:t>
             </a:r>
             <a:endParaRPr lang="bg-BG" dirty="0"/>
           </a:p>
@@ -3780,7 +3839,7 @@
                   <a:schemeClr val="bg1"/>
                 </a:solidFill>
               </a:rPr>
-              <a:t>Add to favorites</a:t>
+              <a:t>Movie Title</a:t>
             </a:r>
             <a:endParaRPr lang="bg-BG" sz="1400" dirty="0">
               <a:solidFill>
@@ -3866,7 +3925,7 @@
         </p:blipFill>
         <p:spPr>
           <a:xfrm>
-            <a:off x="842480" y="1700643"/>
+            <a:off x="811121" y="1436249"/>
             <a:ext cx="1053102" cy="1558702"/>
           </a:xfrm>
           <a:prstGeom prst="rect">
@@ -3876,14 +3935,14 @@
       </p:pic>
       <p:sp>
         <p:nvSpPr>
-          <p:cNvPr id="13" name="TextBox 12"/>
+          <p:cNvPr id="15" name="TextBox 14"/>
           <p:cNvSpPr txBox="1"/>
           <p:nvPr/>
         </p:nvSpPr>
         <p:spPr>
           <a:xfrm>
-            <a:off x="924659" y="1385533"/>
-            <a:ext cx="1083951" cy="307777"/>
+            <a:off x="842480" y="3384489"/>
+            <a:ext cx="787395" cy="276999"/>
           </a:xfrm>
           <a:prstGeom prst="rect">
             <a:avLst/>
@@ -3897,23 +3956,109 @@
           <a:lstStyle/>
           <a:p>
             <a:r>
-              <a:rPr lang="en-US" sz="1400" dirty="0" smtClean="0"/>
-              <a:t>The Martian</a:t>
-            </a:r>
-            <a:endParaRPr lang="bg-BG" sz="1400" dirty="0"/>
-          </a:p>
-        </p:txBody>
-      </p:sp>
-      <p:sp>
-        <p:nvSpPr>
-          <p:cNvPr id="15" name="TextBox 14"/>
+              <a:rPr lang="en-US" sz="1200" b="1" dirty="0" smtClean="0"/>
+              <a:t>My Rank:</a:t>
+            </a:r>
+            <a:endParaRPr lang="bg-BG" sz="1200" b="1" dirty="0"/>
+          </a:p>
+        </p:txBody>
+      </p:sp>
+      <p:sp>
+        <p:nvSpPr>
+          <p:cNvPr id="6" name="TextBox 5"/>
           <p:cNvSpPr txBox="1"/>
           <p:nvPr/>
         </p:nvSpPr>
         <p:spPr>
           <a:xfrm>
-            <a:off x="842480" y="3384489"/>
-            <a:ext cx="787395" cy="276999"/>
+            <a:off x="1993186" y="1445558"/>
+            <a:ext cx="1500027" cy="1631216"/>
+          </a:xfrm>
+          <a:prstGeom prst="rect">
+            <a:avLst/>
+          </a:prstGeom>
+          <a:noFill/>
+        </p:spPr>
+        <p:txBody>
+          <a:bodyPr wrap="square" rtlCol="0">
+            <a:spAutoFit/>
+          </a:bodyPr>
+          <a:lstStyle/>
+          <a:p>
+            <a:r>
+              <a:rPr lang="en-US" sz="1000" b="1" dirty="0"/>
+              <a:t>Overview</a:t>
+            </a:r>
+          </a:p>
+          <a:p>
+            <a:r>
+              <a:rPr lang="en-US" sz="1000" dirty="0"/>
+              <a:t>During a manned mission to Mars, Astronaut Mark </a:t>
+            </a:r>
+            <a:r>
+              <a:rPr lang="en-US" sz="1000" dirty="0" err="1"/>
+              <a:t>Watney</a:t>
+            </a:r>
+            <a:r>
+              <a:rPr lang="en-US" sz="1000" dirty="0"/>
+              <a:t> is presumed dead after a fierce storm and left behind by his crew. But </a:t>
+            </a:r>
+            <a:r>
+              <a:rPr lang="en-US" sz="1000" dirty="0" err="1"/>
+              <a:t>Watney</a:t>
+            </a:r>
+            <a:r>
+              <a:rPr lang="en-US" sz="1000" dirty="0"/>
+              <a:t> has survived and finds himself stranded and alone on the </a:t>
+            </a:r>
+            <a:r>
+              <a:rPr lang="en-US" sz="1000" dirty="0" smtClean="0"/>
+              <a:t>hostile…</a:t>
+            </a:r>
+            <a:endParaRPr lang="bg-BG" sz="1000" dirty="0"/>
+          </a:p>
+        </p:txBody>
+      </p:sp>
+      <p:sp>
+        <p:nvSpPr>
+          <p:cNvPr id="20" name="TextBox 19"/>
+          <p:cNvSpPr txBox="1"/>
+          <p:nvPr/>
+        </p:nvSpPr>
+        <p:spPr>
+          <a:xfrm>
+            <a:off x="1552931" y="3393058"/>
+            <a:ext cx="769028" cy="261610"/>
+          </a:xfrm>
+          <a:prstGeom prst="rect">
+            <a:avLst/>
+          </a:prstGeom>
+          <a:noFill/>
+        </p:spPr>
+        <p:txBody>
+          <a:bodyPr wrap="square" rtlCol="0">
+            <a:spAutoFit/>
+          </a:bodyPr>
+          <a:lstStyle/>
+          <a:p>
+            <a:r>
+              <a:rPr lang="en-US" sz="1100" b="1" dirty="0"/>
+              <a:t>8</a:t>
+            </a:r>
+            <a:endParaRPr lang="bg-BG" sz="1100" b="1" dirty="0"/>
+          </a:p>
+        </p:txBody>
+      </p:sp>
+      <p:sp>
+        <p:nvSpPr>
+          <p:cNvPr id="27" name="TextBox 26"/>
+          <p:cNvSpPr txBox="1"/>
+          <p:nvPr/>
+        </p:nvSpPr>
+        <p:spPr>
+          <a:xfrm>
+            <a:off x="3146887" y="968294"/>
+            <a:ext cx="519822" cy="307777"/>
           </a:xfrm>
           <a:prstGeom prst="rect">
             <a:avLst/>
@@ -3927,360 +4072,16 @@
           <a:lstStyle/>
           <a:p>
             <a:r>
-              <a:rPr lang="en-US" sz="1200" b="1" dirty="0" smtClean="0"/>
-              <a:t>My Rank:</a:t>
-            </a:r>
-            <a:endParaRPr lang="bg-BG" sz="1200" b="1" dirty="0"/>
-          </a:p>
-        </p:txBody>
-      </p:sp>
-      <p:sp>
-        <p:nvSpPr>
-          <p:cNvPr id="6" name="TextBox 5"/>
-          <p:cNvSpPr txBox="1"/>
-          <p:nvPr/>
-        </p:nvSpPr>
-        <p:spPr>
-          <a:xfrm>
-            <a:off x="2090790" y="1647076"/>
-            <a:ext cx="1500027" cy="1631216"/>
-          </a:xfrm>
-          <a:prstGeom prst="rect">
-            <a:avLst/>
-          </a:prstGeom>
-          <a:noFill/>
-        </p:spPr>
-        <p:txBody>
-          <a:bodyPr wrap="square" rtlCol="0">
-            <a:spAutoFit/>
-          </a:bodyPr>
-          <a:lstStyle/>
-          <a:p>
-            <a:r>
-              <a:rPr lang="en-US" sz="1000" b="1" dirty="0"/>
-              <a:t>Overview</a:t>
-            </a:r>
-          </a:p>
-          <a:p>
-            <a:r>
-              <a:rPr lang="en-US" sz="1000" dirty="0"/>
-              <a:t>During a manned mission to Mars, Astronaut Mark </a:t>
-            </a:r>
-            <a:r>
-              <a:rPr lang="en-US" sz="1000" dirty="0" err="1"/>
-              <a:t>Watney</a:t>
-            </a:r>
-            <a:r>
-              <a:rPr lang="en-US" sz="1000" dirty="0"/>
-              <a:t> is presumed dead after a fierce storm and left behind by his crew. But </a:t>
-            </a:r>
-            <a:r>
-              <a:rPr lang="en-US" sz="1000" dirty="0" err="1"/>
-              <a:t>Watney</a:t>
-            </a:r>
-            <a:r>
-              <a:rPr lang="en-US" sz="1000" dirty="0"/>
-              <a:t> has survived and finds himself stranded and alone on the </a:t>
-            </a:r>
-            <a:r>
-              <a:rPr lang="en-US" sz="1000" dirty="0" smtClean="0"/>
-              <a:t>hostile…</a:t>
-            </a:r>
-            <a:endParaRPr lang="bg-BG" sz="1000" dirty="0"/>
-          </a:p>
-        </p:txBody>
-      </p:sp>
-      <p:sp>
-        <p:nvSpPr>
-          <p:cNvPr id="16" name="TextBox 15"/>
-          <p:cNvSpPr txBox="1"/>
-          <p:nvPr/>
-        </p:nvSpPr>
-        <p:spPr>
-          <a:xfrm>
-            <a:off x="842480" y="3667881"/>
-            <a:ext cx="557910" cy="276999"/>
-          </a:xfrm>
-          <a:prstGeom prst="rect">
-            <a:avLst/>
-          </a:prstGeom>
-          <a:noFill/>
-        </p:spPr>
-        <p:txBody>
-          <a:bodyPr wrap="none" rtlCol="0">
-            <a:spAutoFit/>
-          </a:bodyPr>
-          <a:lstStyle/>
-          <a:p>
-            <a:r>
-              <a:rPr lang="en-US" sz="1200" b="1" dirty="0" smtClean="0"/>
-              <a:t>Notes</a:t>
-            </a:r>
-            <a:endParaRPr lang="bg-BG" sz="1200" b="1" dirty="0"/>
-          </a:p>
-        </p:txBody>
-      </p:sp>
-      <p:sp>
-        <p:nvSpPr>
-          <p:cNvPr id="8" name="TextBox 7"/>
-          <p:cNvSpPr txBox="1"/>
-          <p:nvPr/>
-        </p:nvSpPr>
-        <p:spPr>
-          <a:xfrm>
-            <a:off x="842479" y="3893509"/>
-            <a:ext cx="2650733" cy="276999"/>
-          </a:xfrm>
-          <a:prstGeom prst="rect">
-            <a:avLst/>
-          </a:prstGeom>
-          <a:noFill/>
-        </p:spPr>
-        <p:txBody>
-          <a:bodyPr wrap="square" rtlCol="0">
-            <a:spAutoFit/>
-          </a:bodyPr>
-          <a:lstStyle/>
-          <a:p>
-            <a:r>
-              <a:rPr lang="en-US" sz="1200" dirty="0" smtClean="0"/>
-              <a:t>Great movie, want to see it again.</a:t>
-            </a:r>
-            <a:endParaRPr lang="bg-BG" sz="1200" dirty="0"/>
-          </a:p>
-        </p:txBody>
-      </p:sp>
-      <p:cxnSp>
-        <p:nvCxnSpPr>
-          <p:cNvPr id="18" name="Straight Connector 17"/>
-          <p:cNvCxnSpPr/>
-          <p:nvPr/>
-        </p:nvCxnSpPr>
-        <p:spPr>
-          <a:xfrm>
-            <a:off x="924659" y="3661488"/>
-            <a:ext cx="2527458" cy="0"/>
-          </a:xfrm>
-          <a:prstGeom prst="line">
-            <a:avLst/>
-          </a:prstGeom>
-          <a:ln>
-            <a:solidFill>
-              <a:schemeClr val="bg1">
-                <a:lumMod val="85000"/>
-              </a:schemeClr>
-            </a:solidFill>
-          </a:ln>
-        </p:spPr>
-        <p:style>
-          <a:lnRef idx="1">
-            <a:schemeClr val="accent1"/>
-          </a:lnRef>
-          <a:fillRef idx="0">
-            <a:schemeClr val="accent1"/>
-          </a:fillRef>
-          <a:effectRef idx="0">
-            <a:schemeClr val="accent1"/>
-          </a:effectRef>
-          <a:fontRef idx="minor">
-            <a:schemeClr val="tx1"/>
-          </a:fontRef>
-        </p:style>
-      </p:cxnSp>
-      <p:cxnSp>
-        <p:nvCxnSpPr>
-          <p:cNvPr id="19" name="Straight Connector 18"/>
-          <p:cNvCxnSpPr/>
-          <p:nvPr/>
-        </p:nvCxnSpPr>
-        <p:spPr>
-          <a:xfrm>
-            <a:off x="863027" y="4178623"/>
-            <a:ext cx="2527458" cy="0"/>
-          </a:xfrm>
-          <a:prstGeom prst="line">
-            <a:avLst/>
-          </a:prstGeom>
-          <a:ln>
-            <a:solidFill>
-              <a:schemeClr val="bg1">
-                <a:lumMod val="85000"/>
-              </a:schemeClr>
-            </a:solidFill>
-          </a:ln>
-        </p:spPr>
-        <p:style>
-          <a:lnRef idx="1">
-            <a:schemeClr val="accent1"/>
-          </a:lnRef>
-          <a:fillRef idx="0">
-            <a:schemeClr val="accent1"/>
-          </a:fillRef>
-          <a:effectRef idx="0">
-            <a:schemeClr val="accent1"/>
-          </a:effectRef>
-          <a:fontRef idx="minor">
-            <a:schemeClr val="tx1"/>
-          </a:fontRef>
-        </p:style>
-      </p:cxnSp>
-      <p:sp>
-        <p:nvSpPr>
-          <p:cNvPr id="20" name="TextBox 19"/>
-          <p:cNvSpPr txBox="1"/>
-          <p:nvPr/>
-        </p:nvSpPr>
-        <p:spPr>
-          <a:xfrm>
-            <a:off x="1552931" y="3393058"/>
-            <a:ext cx="769028" cy="261610"/>
-          </a:xfrm>
-          <a:prstGeom prst="rect">
-            <a:avLst/>
-          </a:prstGeom>
-          <a:noFill/>
-        </p:spPr>
-        <p:txBody>
-          <a:bodyPr wrap="square" rtlCol="0">
-            <a:spAutoFit/>
-          </a:bodyPr>
-          <a:lstStyle/>
-          <a:p>
-            <a:r>
-              <a:rPr lang="en-US" sz="1100" b="1" dirty="0"/>
-              <a:t>8</a:t>
-            </a:r>
-            <a:endParaRPr lang="bg-BG" sz="1100" b="1" dirty="0"/>
-          </a:p>
-        </p:txBody>
-      </p:sp>
-      <p:pic>
-        <p:nvPicPr>
-          <p:cNvPr id="21" name="Picture 20"/>
-          <p:cNvPicPr>
-            <a:picLocks noChangeAspect="1"/>
-          </p:cNvPicPr>
-          <p:nvPr/>
-        </p:nvPicPr>
-        <p:blipFill>
-          <a:blip r:embed="rId3" cstate="print">
-            <a:extLst>
-              <a:ext uri="{28A0092B-C50C-407E-A947-70E740481C1C}">
-                <a14:useLocalDpi xmlns:a14="http://schemas.microsoft.com/office/drawing/2010/main" val="0"/>
-              </a:ext>
-            </a:extLst>
-          </a:blip>
-          <a:stretch>
-            <a:fillRect/>
-          </a:stretch>
-        </p:blipFill>
-        <p:spPr>
-          <a:xfrm>
-            <a:off x="1847799" y="4521975"/>
-            <a:ext cx="842479" cy="594274"/>
-          </a:xfrm>
-          <a:prstGeom prst="rect">
-            <a:avLst/>
-          </a:prstGeom>
-        </p:spPr>
-      </p:pic>
-      <p:pic>
-        <p:nvPicPr>
-          <p:cNvPr id="22" name="Picture 21"/>
-          <p:cNvPicPr>
-            <a:picLocks noChangeAspect="1"/>
-          </p:cNvPicPr>
-          <p:nvPr/>
-        </p:nvPicPr>
-        <p:blipFill>
-          <a:blip r:embed="rId4" cstate="print">
-            <a:extLst>
-              <a:ext uri="{28A0092B-C50C-407E-A947-70E740481C1C}">
-                <a14:useLocalDpi xmlns:a14="http://schemas.microsoft.com/office/drawing/2010/main" val="0"/>
-              </a:ext>
-            </a:extLst>
-          </a:blip>
-          <a:stretch>
-            <a:fillRect/>
-          </a:stretch>
-        </p:blipFill>
-        <p:spPr>
-          <a:xfrm>
-            <a:off x="924659" y="4514516"/>
-            <a:ext cx="796514" cy="594274"/>
-          </a:xfrm>
-          <a:prstGeom prst="rect">
-            <a:avLst/>
-          </a:prstGeom>
-        </p:spPr>
-      </p:pic>
-      <p:sp>
-        <p:nvSpPr>
-          <p:cNvPr id="24" name="TextBox 23"/>
-          <p:cNvSpPr txBox="1"/>
-          <p:nvPr/>
-        </p:nvSpPr>
-        <p:spPr>
-          <a:xfrm>
-            <a:off x="811121" y="4211800"/>
-            <a:ext cx="889090" cy="276999"/>
-          </a:xfrm>
-          <a:prstGeom prst="rect">
-            <a:avLst/>
-          </a:prstGeom>
-          <a:noFill/>
-        </p:spPr>
-        <p:txBody>
-          <a:bodyPr wrap="none" rtlCol="0">
-            <a:spAutoFit/>
-          </a:bodyPr>
-          <a:lstStyle/>
-          <a:p>
-            <a:r>
-              <a:rPr lang="en-US" sz="1200" b="1" dirty="0" smtClean="0"/>
-              <a:t>Fan Photos</a:t>
-            </a:r>
-            <a:endParaRPr lang="bg-BG" sz="1200" b="1" dirty="0"/>
-          </a:p>
-        </p:txBody>
-      </p:sp>
-      <p:sp>
-        <p:nvSpPr>
-          <p:cNvPr id="25" name="TextBox 24"/>
-          <p:cNvSpPr txBox="1"/>
-          <p:nvPr/>
-        </p:nvSpPr>
-        <p:spPr>
-          <a:xfrm>
-            <a:off x="2817688" y="4624402"/>
-            <a:ext cx="652408" cy="369332"/>
-          </a:xfrm>
-          <a:prstGeom prst="rect">
-            <a:avLst/>
-          </a:prstGeom>
-          <a:noFill/>
-        </p:spPr>
-        <p:txBody>
-          <a:bodyPr wrap="square" rtlCol="0">
-            <a:spAutoFit/>
-          </a:bodyPr>
-          <a:lstStyle/>
-          <a:p>
-            <a:r>
-              <a:rPr lang="en-US" dirty="0" smtClean="0">
+              <a:rPr lang="en-US" sz="1400" dirty="0" smtClean="0">
                 <a:solidFill>
-                  <a:schemeClr val="bg1">
-                    <a:lumMod val="75000"/>
-                  </a:schemeClr>
+                  <a:schemeClr val="bg1"/>
                 </a:solidFill>
               </a:rPr>
-              <a:t>Add</a:t>
-            </a:r>
-            <a:endParaRPr lang="bg-BG" dirty="0">
+              <a:t>Save</a:t>
+            </a:r>
+            <a:endParaRPr lang="bg-BG" sz="1400" dirty="0">
               <a:solidFill>
-                <a:schemeClr val="bg1">
-                  <a:lumMod val="75000"/>
-                </a:schemeClr>
+                <a:schemeClr val="bg1"/>
               </a:solidFill>
             </a:endParaRPr>
           </a:p>
@@ -4288,27 +4089,21 @@
       </p:sp>
       <p:sp>
         <p:nvSpPr>
-          <p:cNvPr id="26" name="Rectangle 25"/>
+          <p:cNvPr id="3" name="Oval 2"/>
           <p:cNvSpPr/>
           <p:nvPr/>
         </p:nvSpPr>
         <p:spPr>
           <a:xfrm>
-            <a:off x="2743200" y="4499073"/>
-            <a:ext cx="801384" cy="619991"/>
-          </a:xfrm>
-          <a:prstGeom prst="rect">
-            <a:avLst/>
-          </a:prstGeom>
-          <a:noFill/>
-          <a:ln>
-            <a:solidFill>
-              <a:schemeClr val="bg1">
-                <a:lumMod val="75000"/>
-              </a:schemeClr>
-            </a:solidFill>
-            <a:prstDash val="sysDash"/>
-          </a:ln>
+            <a:off x="3030876" y="4792894"/>
+            <a:ext cx="462337" cy="421241"/>
+          </a:xfrm>
+          <a:prstGeom prst="ellipse">
+            <a:avLst/>
+          </a:prstGeom>
+          <a:solidFill>
+            <a:srgbClr val="D60093"/>
+          </a:solidFill>
         </p:spPr>
         <p:style>
           <a:lnRef idx="2">
@@ -4331,45 +4126,11 @@
           <a:lstStyle/>
           <a:p>
             <a:pPr algn="ctr"/>
-            <a:endParaRPr lang="bg-BG"/>
-          </a:p>
-        </p:txBody>
-      </p:sp>
-      <p:sp>
-        <p:nvSpPr>
-          <p:cNvPr id="27" name="TextBox 26"/>
-          <p:cNvSpPr txBox="1"/>
-          <p:nvPr/>
-        </p:nvSpPr>
-        <p:spPr>
-          <a:xfrm>
-            <a:off x="3146887" y="968294"/>
-            <a:ext cx="519822" cy="307777"/>
-          </a:xfrm>
-          <a:prstGeom prst="rect">
-            <a:avLst/>
-          </a:prstGeom>
-          <a:noFill/>
-        </p:spPr>
-        <p:txBody>
-          <a:bodyPr wrap="none" rtlCol="0">
-            <a:spAutoFit/>
-          </a:bodyPr>
-          <a:lstStyle/>
-          <a:p>
-            <a:r>
-              <a:rPr lang="en-US" sz="1400" dirty="0" smtClean="0">
-                <a:solidFill>
-                  <a:schemeClr val="bg1"/>
-                </a:solidFill>
-              </a:rPr>
-              <a:t>Save</a:t>
-            </a:r>
-            <a:endParaRPr lang="bg-BG" sz="1400" dirty="0">
-              <a:solidFill>
-                <a:schemeClr val="bg1"/>
-              </a:solidFill>
-            </a:endParaRPr>
+            <a:r>
+              <a:rPr lang="en-US" dirty="0" smtClean="0"/>
+              <a:t>+</a:t>
+            </a:r>
+            <a:endParaRPr lang="bg-BG" dirty="0"/>
           </a:p>
         </p:txBody>
       </p:sp>
@@ -4427,6 +4188,707 @@
           <a:p>
             <a:r>
               <a:rPr lang="en-US" b="1" dirty="0" smtClean="0"/>
+              <a:t>Add to favorites</a:t>
+            </a:r>
+            <a:endParaRPr lang="bg-BG" b="1" dirty="0"/>
+          </a:p>
+        </p:txBody>
+      </p:sp>
+      <p:sp>
+        <p:nvSpPr>
+          <p:cNvPr id="7" name="Rectangle 6"/>
+          <p:cNvSpPr/>
+          <p:nvPr/>
+        </p:nvSpPr>
+        <p:spPr>
+          <a:xfrm>
+            <a:off x="765425" y="924137"/>
+            <a:ext cx="2943546" cy="396092"/>
+          </a:xfrm>
+          <a:prstGeom prst="rect">
+            <a:avLst/>
+          </a:prstGeom>
+          <a:solidFill>
+            <a:srgbClr val="00B0F0"/>
+          </a:solidFill>
+          <a:ln>
+            <a:noFill/>
+          </a:ln>
+        </p:spPr>
+        <p:style>
+          <a:lnRef idx="2">
+            <a:schemeClr val="accent1">
+              <a:shade val="50000"/>
+            </a:schemeClr>
+          </a:lnRef>
+          <a:fillRef idx="1">
+            <a:schemeClr val="accent1"/>
+          </a:fillRef>
+          <a:effectRef idx="0">
+            <a:schemeClr val="accent1"/>
+          </a:effectRef>
+          <a:fontRef idx="minor">
+            <a:schemeClr val="lt1"/>
+          </a:fontRef>
+        </p:style>
+        <p:txBody>
+          <a:bodyPr rtlCol="0" anchor="ctr"/>
+          <a:lstStyle/>
+          <a:p>
+            <a:pPr algn="ctr"/>
+            <a:r>
+              <a:rPr lang="en-US" sz="1400" dirty="0" smtClean="0">
+                <a:solidFill>
+                  <a:schemeClr val="bg1"/>
+                </a:solidFill>
+              </a:rPr>
+              <a:t>Add to favorites</a:t>
+            </a:r>
+            <a:endParaRPr lang="bg-BG" sz="1400" dirty="0">
+              <a:solidFill>
+                <a:schemeClr val="bg1"/>
+              </a:solidFill>
+            </a:endParaRPr>
+          </a:p>
+        </p:txBody>
+      </p:sp>
+      <p:sp>
+        <p:nvSpPr>
+          <p:cNvPr id="10" name="TextBox 9"/>
+          <p:cNvSpPr txBox="1"/>
+          <p:nvPr/>
+        </p:nvSpPr>
+        <p:spPr>
+          <a:xfrm>
+            <a:off x="4726112" y="757451"/>
+            <a:ext cx="6863138" cy="1477328"/>
+          </a:xfrm>
+          <a:prstGeom prst="rect">
+            <a:avLst/>
+          </a:prstGeom>
+          <a:noFill/>
+        </p:spPr>
+        <p:txBody>
+          <a:bodyPr wrap="square" rtlCol="0">
+            <a:spAutoFit/>
+          </a:bodyPr>
+          <a:lstStyle/>
+          <a:p>
+            <a:r>
+              <a:rPr lang="en-US" dirty="0" smtClean="0"/>
+              <a:t>Details about a movie that the fan has seen. Including:</a:t>
+            </a:r>
+          </a:p>
+          <a:p>
+            <a:pPr marL="285750" indent="-285750">
+              <a:buFont typeface="Arial" panose="020B0604020202020204" pitchFamily="34" charset="0"/>
+              <a:buChar char="•"/>
+            </a:pPr>
+            <a:r>
+              <a:rPr lang="en-US" dirty="0" smtClean="0"/>
+              <a:t>Fan rank</a:t>
+            </a:r>
+          </a:p>
+          <a:p>
+            <a:pPr marL="285750" indent="-285750">
+              <a:buFont typeface="Arial" panose="020B0604020202020204" pitchFamily="34" charset="0"/>
+              <a:buChar char="•"/>
+            </a:pPr>
+            <a:r>
+              <a:rPr lang="en-US" dirty="0" smtClean="0"/>
+              <a:t>Fan notes about the movie</a:t>
+            </a:r>
+          </a:p>
+          <a:p>
+            <a:pPr marL="285750" indent="-285750">
+              <a:buFont typeface="Arial" panose="020B0604020202020204" pitchFamily="34" charset="0"/>
+              <a:buChar char="•"/>
+            </a:pPr>
+            <a:r>
+              <a:rPr lang="en-US" dirty="0" smtClean="0"/>
+              <a:t>Fan pictures about the movie (taken with the camera at the premiere for instance)</a:t>
+            </a:r>
+            <a:endParaRPr lang="bg-BG" dirty="0"/>
+          </a:p>
+        </p:txBody>
+      </p:sp>
+      <p:pic>
+        <p:nvPicPr>
+          <p:cNvPr id="2" name="Picture 1"/>
+          <p:cNvPicPr>
+            <a:picLocks noChangeAspect="1"/>
+          </p:cNvPicPr>
+          <p:nvPr/>
+        </p:nvPicPr>
+        <p:blipFill>
+          <a:blip r:embed="rId2"/>
+          <a:stretch>
+            <a:fillRect/>
+          </a:stretch>
+        </p:blipFill>
+        <p:spPr>
+          <a:xfrm>
+            <a:off x="842480" y="1700643"/>
+            <a:ext cx="1053102" cy="1558702"/>
+          </a:xfrm>
+          <a:prstGeom prst="rect">
+            <a:avLst/>
+          </a:prstGeom>
+        </p:spPr>
+      </p:pic>
+      <p:sp>
+        <p:nvSpPr>
+          <p:cNvPr id="13" name="TextBox 12"/>
+          <p:cNvSpPr txBox="1"/>
+          <p:nvPr/>
+        </p:nvSpPr>
+        <p:spPr>
+          <a:xfrm>
+            <a:off x="924659" y="1385533"/>
+            <a:ext cx="1083951" cy="307777"/>
+          </a:xfrm>
+          <a:prstGeom prst="rect">
+            <a:avLst/>
+          </a:prstGeom>
+          <a:noFill/>
+        </p:spPr>
+        <p:txBody>
+          <a:bodyPr wrap="none" rtlCol="0">
+            <a:spAutoFit/>
+          </a:bodyPr>
+          <a:lstStyle/>
+          <a:p>
+            <a:r>
+              <a:rPr lang="en-US" sz="1400" dirty="0" smtClean="0"/>
+              <a:t>The Martian</a:t>
+            </a:r>
+            <a:endParaRPr lang="bg-BG" sz="1400" dirty="0"/>
+          </a:p>
+        </p:txBody>
+      </p:sp>
+      <p:sp>
+        <p:nvSpPr>
+          <p:cNvPr id="15" name="TextBox 14"/>
+          <p:cNvSpPr txBox="1"/>
+          <p:nvPr/>
+        </p:nvSpPr>
+        <p:spPr>
+          <a:xfrm>
+            <a:off x="842480" y="3384489"/>
+            <a:ext cx="787395" cy="276999"/>
+          </a:xfrm>
+          <a:prstGeom prst="rect">
+            <a:avLst/>
+          </a:prstGeom>
+          <a:noFill/>
+        </p:spPr>
+        <p:txBody>
+          <a:bodyPr wrap="none" rtlCol="0">
+            <a:spAutoFit/>
+          </a:bodyPr>
+          <a:lstStyle/>
+          <a:p>
+            <a:r>
+              <a:rPr lang="en-US" sz="1200" b="1" dirty="0" smtClean="0"/>
+              <a:t>My Rank:</a:t>
+            </a:r>
+            <a:endParaRPr lang="bg-BG" sz="1200" b="1" dirty="0"/>
+          </a:p>
+        </p:txBody>
+      </p:sp>
+      <p:sp>
+        <p:nvSpPr>
+          <p:cNvPr id="6" name="TextBox 5"/>
+          <p:cNvSpPr txBox="1"/>
+          <p:nvPr/>
+        </p:nvSpPr>
+        <p:spPr>
+          <a:xfrm>
+            <a:off x="2090790" y="1647076"/>
+            <a:ext cx="1500027" cy="1631216"/>
+          </a:xfrm>
+          <a:prstGeom prst="rect">
+            <a:avLst/>
+          </a:prstGeom>
+          <a:noFill/>
+        </p:spPr>
+        <p:txBody>
+          <a:bodyPr wrap="square" rtlCol="0">
+            <a:spAutoFit/>
+          </a:bodyPr>
+          <a:lstStyle/>
+          <a:p>
+            <a:r>
+              <a:rPr lang="en-US" sz="1000" b="1" dirty="0"/>
+              <a:t>Overview</a:t>
+            </a:r>
+          </a:p>
+          <a:p>
+            <a:r>
+              <a:rPr lang="en-US" sz="1000" dirty="0"/>
+              <a:t>During a manned mission to Mars, Astronaut Mark </a:t>
+            </a:r>
+            <a:r>
+              <a:rPr lang="en-US" sz="1000" dirty="0" err="1"/>
+              <a:t>Watney</a:t>
+            </a:r>
+            <a:r>
+              <a:rPr lang="en-US" sz="1000" dirty="0"/>
+              <a:t> is presumed dead after a fierce storm and left behind by his crew. But </a:t>
+            </a:r>
+            <a:r>
+              <a:rPr lang="en-US" sz="1000" dirty="0" err="1"/>
+              <a:t>Watney</a:t>
+            </a:r>
+            <a:r>
+              <a:rPr lang="en-US" sz="1000" dirty="0"/>
+              <a:t> has survived and finds himself stranded and alone on the </a:t>
+            </a:r>
+            <a:r>
+              <a:rPr lang="en-US" sz="1000" dirty="0" smtClean="0"/>
+              <a:t>hostile…</a:t>
+            </a:r>
+            <a:endParaRPr lang="bg-BG" sz="1000" dirty="0"/>
+          </a:p>
+        </p:txBody>
+      </p:sp>
+      <p:sp>
+        <p:nvSpPr>
+          <p:cNvPr id="16" name="TextBox 15"/>
+          <p:cNvSpPr txBox="1"/>
+          <p:nvPr/>
+        </p:nvSpPr>
+        <p:spPr>
+          <a:xfrm>
+            <a:off x="842480" y="3667881"/>
+            <a:ext cx="557910" cy="276999"/>
+          </a:xfrm>
+          <a:prstGeom prst="rect">
+            <a:avLst/>
+          </a:prstGeom>
+          <a:noFill/>
+        </p:spPr>
+        <p:txBody>
+          <a:bodyPr wrap="none" rtlCol="0">
+            <a:spAutoFit/>
+          </a:bodyPr>
+          <a:lstStyle/>
+          <a:p>
+            <a:r>
+              <a:rPr lang="en-US" sz="1200" b="1" dirty="0" smtClean="0"/>
+              <a:t>Notes</a:t>
+            </a:r>
+            <a:endParaRPr lang="bg-BG" sz="1200" b="1" dirty="0"/>
+          </a:p>
+        </p:txBody>
+      </p:sp>
+      <p:sp>
+        <p:nvSpPr>
+          <p:cNvPr id="8" name="TextBox 7"/>
+          <p:cNvSpPr txBox="1"/>
+          <p:nvPr/>
+        </p:nvSpPr>
+        <p:spPr>
+          <a:xfrm>
+            <a:off x="842479" y="3893509"/>
+            <a:ext cx="2650733" cy="276999"/>
+          </a:xfrm>
+          <a:prstGeom prst="rect">
+            <a:avLst/>
+          </a:prstGeom>
+          <a:noFill/>
+        </p:spPr>
+        <p:txBody>
+          <a:bodyPr wrap="square" rtlCol="0">
+            <a:spAutoFit/>
+          </a:bodyPr>
+          <a:lstStyle/>
+          <a:p>
+            <a:r>
+              <a:rPr lang="en-US" sz="1200" dirty="0" smtClean="0"/>
+              <a:t>Great movie, want to see it again.</a:t>
+            </a:r>
+            <a:endParaRPr lang="bg-BG" sz="1200" dirty="0"/>
+          </a:p>
+        </p:txBody>
+      </p:sp>
+      <p:cxnSp>
+        <p:nvCxnSpPr>
+          <p:cNvPr id="18" name="Straight Connector 17"/>
+          <p:cNvCxnSpPr/>
+          <p:nvPr/>
+        </p:nvCxnSpPr>
+        <p:spPr>
+          <a:xfrm>
+            <a:off x="924659" y="3661488"/>
+            <a:ext cx="2527458" cy="0"/>
+          </a:xfrm>
+          <a:prstGeom prst="line">
+            <a:avLst/>
+          </a:prstGeom>
+          <a:ln>
+            <a:solidFill>
+              <a:schemeClr val="bg1">
+                <a:lumMod val="85000"/>
+              </a:schemeClr>
+            </a:solidFill>
+          </a:ln>
+        </p:spPr>
+        <p:style>
+          <a:lnRef idx="1">
+            <a:schemeClr val="accent1"/>
+          </a:lnRef>
+          <a:fillRef idx="0">
+            <a:schemeClr val="accent1"/>
+          </a:fillRef>
+          <a:effectRef idx="0">
+            <a:schemeClr val="accent1"/>
+          </a:effectRef>
+          <a:fontRef idx="minor">
+            <a:schemeClr val="tx1"/>
+          </a:fontRef>
+        </p:style>
+      </p:cxnSp>
+      <p:cxnSp>
+        <p:nvCxnSpPr>
+          <p:cNvPr id="19" name="Straight Connector 18"/>
+          <p:cNvCxnSpPr/>
+          <p:nvPr/>
+        </p:nvCxnSpPr>
+        <p:spPr>
+          <a:xfrm>
+            <a:off x="863027" y="4178623"/>
+            <a:ext cx="2527458" cy="0"/>
+          </a:xfrm>
+          <a:prstGeom prst="line">
+            <a:avLst/>
+          </a:prstGeom>
+          <a:ln>
+            <a:solidFill>
+              <a:schemeClr val="bg1">
+                <a:lumMod val="85000"/>
+              </a:schemeClr>
+            </a:solidFill>
+          </a:ln>
+        </p:spPr>
+        <p:style>
+          <a:lnRef idx="1">
+            <a:schemeClr val="accent1"/>
+          </a:lnRef>
+          <a:fillRef idx="0">
+            <a:schemeClr val="accent1"/>
+          </a:fillRef>
+          <a:effectRef idx="0">
+            <a:schemeClr val="accent1"/>
+          </a:effectRef>
+          <a:fontRef idx="minor">
+            <a:schemeClr val="tx1"/>
+          </a:fontRef>
+        </p:style>
+      </p:cxnSp>
+      <p:sp>
+        <p:nvSpPr>
+          <p:cNvPr id="20" name="TextBox 19"/>
+          <p:cNvSpPr txBox="1"/>
+          <p:nvPr/>
+        </p:nvSpPr>
+        <p:spPr>
+          <a:xfrm>
+            <a:off x="1552931" y="3393058"/>
+            <a:ext cx="769028" cy="261610"/>
+          </a:xfrm>
+          <a:prstGeom prst="rect">
+            <a:avLst/>
+          </a:prstGeom>
+          <a:noFill/>
+        </p:spPr>
+        <p:txBody>
+          <a:bodyPr wrap="square" rtlCol="0">
+            <a:spAutoFit/>
+          </a:bodyPr>
+          <a:lstStyle/>
+          <a:p>
+            <a:r>
+              <a:rPr lang="en-US" sz="1100" b="1" dirty="0"/>
+              <a:t>8</a:t>
+            </a:r>
+            <a:endParaRPr lang="bg-BG" sz="1100" b="1" dirty="0"/>
+          </a:p>
+        </p:txBody>
+      </p:sp>
+      <p:pic>
+        <p:nvPicPr>
+          <p:cNvPr id="21" name="Picture 20"/>
+          <p:cNvPicPr>
+            <a:picLocks noChangeAspect="1"/>
+          </p:cNvPicPr>
+          <p:nvPr/>
+        </p:nvPicPr>
+        <p:blipFill>
+          <a:blip r:embed="rId3" cstate="print">
+            <a:extLst>
+              <a:ext uri="{28A0092B-C50C-407E-A947-70E740481C1C}">
+                <a14:useLocalDpi xmlns:a14="http://schemas.microsoft.com/office/drawing/2010/main" val="0"/>
+              </a:ext>
+            </a:extLst>
+          </a:blip>
+          <a:stretch>
+            <a:fillRect/>
+          </a:stretch>
+        </p:blipFill>
+        <p:spPr>
+          <a:xfrm>
+            <a:off x="1847799" y="4521975"/>
+            <a:ext cx="842479" cy="594274"/>
+          </a:xfrm>
+          <a:prstGeom prst="rect">
+            <a:avLst/>
+          </a:prstGeom>
+        </p:spPr>
+      </p:pic>
+      <p:pic>
+        <p:nvPicPr>
+          <p:cNvPr id="22" name="Picture 21"/>
+          <p:cNvPicPr>
+            <a:picLocks noChangeAspect="1"/>
+          </p:cNvPicPr>
+          <p:nvPr/>
+        </p:nvPicPr>
+        <p:blipFill>
+          <a:blip r:embed="rId4" cstate="print">
+            <a:extLst>
+              <a:ext uri="{28A0092B-C50C-407E-A947-70E740481C1C}">
+                <a14:useLocalDpi xmlns:a14="http://schemas.microsoft.com/office/drawing/2010/main" val="0"/>
+              </a:ext>
+            </a:extLst>
+          </a:blip>
+          <a:stretch>
+            <a:fillRect/>
+          </a:stretch>
+        </p:blipFill>
+        <p:spPr>
+          <a:xfrm>
+            <a:off x="924659" y="4514516"/>
+            <a:ext cx="796514" cy="594274"/>
+          </a:xfrm>
+          <a:prstGeom prst="rect">
+            <a:avLst/>
+          </a:prstGeom>
+        </p:spPr>
+      </p:pic>
+      <p:sp>
+        <p:nvSpPr>
+          <p:cNvPr id="24" name="TextBox 23"/>
+          <p:cNvSpPr txBox="1"/>
+          <p:nvPr/>
+        </p:nvSpPr>
+        <p:spPr>
+          <a:xfrm>
+            <a:off x="811121" y="4211800"/>
+            <a:ext cx="889090" cy="276999"/>
+          </a:xfrm>
+          <a:prstGeom prst="rect">
+            <a:avLst/>
+          </a:prstGeom>
+          <a:noFill/>
+        </p:spPr>
+        <p:txBody>
+          <a:bodyPr wrap="none" rtlCol="0">
+            <a:spAutoFit/>
+          </a:bodyPr>
+          <a:lstStyle/>
+          <a:p>
+            <a:r>
+              <a:rPr lang="en-US" sz="1200" b="1" dirty="0" smtClean="0"/>
+              <a:t>Fan Photos</a:t>
+            </a:r>
+            <a:endParaRPr lang="bg-BG" sz="1200" b="1" dirty="0"/>
+          </a:p>
+        </p:txBody>
+      </p:sp>
+      <p:sp>
+        <p:nvSpPr>
+          <p:cNvPr id="25" name="TextBox 24"/>
+          <p:cNvSpPr txBox="1"/>
+          <p:nvPr/>
+        </p:nvSpPr>
+        <p:spPr>
+          <a:xfrm>
+            <a:off x="2817688" y="4624402"/>
+            <a:ext cx="652408" cy="369332"/>
+          </a:xfrm>
+          <a:prstGeom prst="rect">
+            <a:avLst/>
+          </a:prstGeom>
+          <a:noFill/>
+        </p:spPr>
+        <p:txBody>
+          <a:bodyPr wrap="square" rtlCol="0">
+            <a:spAutoFit/>
+          </a:bodyPr>
+          <a:lstStyle/>
+          <a:p>
+            <a:r>
+              <a:rPr lang="en-US" dirty="0" smtClean="0">
+                <a:solidFill>
+                  <a:schemeClr val="bg1">
+                    <a:lumMod val="75000"/>
+                  </a:schemeClr>
+                </a:solidFill>
+              </a:rPr>
+              <a:t>Add</a:t>
+            </a:r>
+            <a:endParaRPr lang="bg-BG" dirty="0">
+              <a:solidFill>
+                <a:schemeClr val="bg1">
+                  <a:lumMod val="75000"/>
+                </a:schemeClr>
+              </a:solidFill>
+            </a:endParaRPr>
+          </a:p>
+        </p:txBody>
+      </p:sp>
+      <p:sp>
+        <p:nvSpPr>
+          <p:cNvPr id="26" name="Rectangle 25"/>
+          <p:cNvSpPr/>
+          <p:nvPr/>
+        </p:nvSpPr>
+        <p:spPr>
+          <a:xfrm>
+            <a:off x="2743200" y="4499073"/>
+            <a:ext cx="801384" cy="619991"/>
+          </a:xfrm>
+          <a:prstGeom prst="rect">
+            <a:avLst/>
+          </a:prstGeom>
+          <a:noFill/>
+          <a:ln>
+            <a:solidFill>
+              <a:schemeClr val="bg1">
+                <a:lumMod val="75000"/>
+              </a:schemeClr>
+            </a:solidFill>
+            <a:prstDash val="sysDash"/>
+          </a:ln>
+        </p:spPr>
+        <p:style>
+          <a:lnRef idx="2">
+            <a:schemeClr val="accent1">
+              <a:shade val="50000"/>
+            </a:schemeClr>
+          </a:lnRef>
+          <a:fillRef idx="1">
+            <a:schemeClr val="accent1"/>
+          </a:fillRef>
+          <a:effectRef idx="0">
+            <a:schemeClr val="accent1"/>
+          </a:effectRef>
+          <a:fontRef idx="minor">
+            <a:schemeClr val="lt1"/>
+          </a:fontRef>
+        </p:style>
+        <p:txBody>
+          <a:bodyPr rtlCol="0" anchor="ctr"/>
+          <a:lstStyle/>
+          <a:p>
+            <a:pPr algn="ctr"/>
+            <a:endParaRPr lang="bg-BG"/>
+          </a:p>
+        </p:txBody>
+      </p:sp>
+      <p:sp>
+        <p:nvSpPr>
+          <p:cNvPr id="27" name="TextBox 26"/>
+          <p:cNvSpPr txBox="1"/>
+          <p:nvPr/>
+        </p:nvSpPr>
+        <p:spPr>
+          <a:xfrm>
+            <a:off x="3146887" y="968294"/>
+            <a:ext cx="519822" cy="307777"/>
+          </a:xfrm>
+          <a:prstGeom prst="rect">
+            <a:avLst/>
+          </a:prstGeom>
+          <a:noFill/>
+        </p:spPr>
+        <p:txBody>
+          <a:bodyPr wrap="none" rtlCol="0">
+            <a:spAutoFit/>
+          </a:bodyPr>
+          <a:lstStyle/>
+          <a:p>
+            <a:r>
+              <a:rPr lang="en-US" sz="1400" dirty="0" smtClean="0">
+                <a:solidFill>
+                  <a:schemeClr val="bg1"/>
+                </a:solidFill>
+              </a:rPr>
+              <a:t>Save</a:t>
+            </a:r>
+            <a:endParaRPr lang="bg-BG" sz="1400" dirty="0">
+              <a:solidFill>
+                <a:schemeClr val="bg1"/>
+              </a:solidFill>
+            </a:endParaRPr>
+          </a:p>
+        </p:txBody>
+      </p:sp>
+    </p:spTree>
+    <p:extLst>
+      <p:ext uri="{BB962C8B-B14F-4D97-AF65-F5344CB8AC3E}">
+        <p14:creationId xmlns:p14="http://schemas.microsoft.com/office/powerpoint/2010/main" val="2130911781"/>
+      </p:ext>
+    </p:extLst>
+  </p:cSld>
+  <p:clrMapOvr>
+    <a:masterClrMapping/>
+  </p:clrMapOvr>
+</p:sld>
+</file>
+
+<file path=ppt/slides/slide6.xml><?xml version="1.0" encoding="utf-8"?>
+<p:sld xmlns:a="http://schemas.openxmlformats.org/drawingml/2006/main" xmlns:r="http://schemas.openxmlformats.org/officeDocument/2006/relationships" xmlns:p="http://schemas.openxmlformats.org/presentationml/2006/main">
+  <p:cSld>
+    <p:spTree>
+      <p:nvGrpSpPr>
+        <p:cNvPr id="1" name=""/>
+        <p:cNvGrpSpPr/>
+        <p:nvPr/>
+      </p:nvGrpSpPr>
+      <p:grpSpPr>
+        <a:xfrm>
+          <a:off x="0" y="0"/>
+          <a:ext cx="0" cy="0"/>
+          <a:chOff x="0" y="0"/>
+          <a:chExt cx="0" cy="0"/>
+        </a:xfrm>
+      </p:grpSpPr>
+      <p:sp>
+        <p:nvSpPr>
+          <p:cNvPr id="5" name="TextBox 4"/>
+          <p:cNvSpPr txBox="1"/>
+          <p:nvPr/>
+        </p:nvSpPr>
+        <p:spPr>
+          <a:xfrm>
+            <a:off x="6411074" y="251716"/>
+            <a:ext cx="2578814" cy="369332"/>
+          </a:xfrm>
+          <a:prstGeom prst="rect">
+            <a:avLst/>
+          </a:prstGeom>
+          <a:noFill/>
+        </p:spPr>
+        <p:txBody>
+          <a:bodyPr wrap="square" rtlCol="0">
+            <a:spAutoFit/>
+          </a:bodyPr>
+          <a:lstStyle/>
+          <a:p>
+            <a:r>
+              <a:rPr lang="en-US" b="1" dirty="0" smtClean="0"/>
               <a:t>Add photo</a:t>
             </a:r>
             <a:endParaRPr lang="bg-BG" b="1" dirty="0"/>
@@ -4681,7 +5143,7 @@
 </p:sld>
 </file>
 
-<file path=ppt/slides/slide6.xml><?xml version="1.0" encoding="utf-8"?>
+<file path=ppt/slides/slide7.xml><?xml version="1.0" encoding="utf-8"?>
 <p:sld xmlns:a="http://schemas.openxmlformats.org/drawingml/2006/main" xmlns:r="http://schemas.openxmlformats.org/officeDocument/2006/relationships" xmlns:p="http://schemas.openxmlformats.org/presentationml/2006/main">
   <p:cSld>
     <p:spTree>

</xml_diff>